<commit_message>
11kl 3sav, 12kl 5-6pam
</commit_message>
<xml_diff>
--- a/src/pages/pamokos/vienuoliktokai/files/pamoka8.pptx
+++ b/src/pages/pamokos/vienuoliktokai/files/pamoka8.pptx
@@ -218,7 +218,7 @@
           <a:p>
             <a:fld id="{2C190143-9619-4880-BD09-7A2D8A41A271}" type="datetimeFigureOut">
               <a:rPr lang="lt-LT" smtClean="0"/>
-              <a:t>2023-09-13</a:t>
+              <a:t>2023-09-16</a:t>
             </a:fld>
             <a:endParaRPr lang="lt-LT"/>
           </a:p>
@@ -1841,7 +1841,7 @@
             <a:fld id="{AFF29E89-4237-4E4B-9600-F71E36C17C35}" type="datetimeFigureOut">
               <a:rPr lang="en-US" smtClean="0"/>
               <a:pPr/>
-              <a:t>9/13/2023</a:t>
+              <a:t>9/16/2023</a:t>
             </a:fld>
             <a:endParaRPr lang="en-US"/>
           </a:p>
@@ -2013,7 +2013,7 @@
             <a:fld id="{AFF29E89-4237-4E4B-9600-F71E36C17C35}" type="datetimeFigureOut">
               <a:rPr lang="en-US" smtClean="0"/>
               <a:pPr/>
-              <a:t>9/13/2023</a:t>
+              <a:t>9/16/2023</a:t>
             </a:fld>
             <a:endParaRPr lang="en-US"/>
           </a:p>
@@ -2195,7 +2195,7 @@
             <a:fld id="{AFF29E89-4237-4E4B-9600-F71E36C17C35}" type="datetimeFigureOut">
               <a:rPr lang="en-US" smtClean="0"/>
               <a:pPr/>
-              <a:t>9/13/2023</a:t>
+              <a:t>9/16/2023</a:t>
             </a:fld>
             <a:endParaRPr lang="en-US"/>
           </a:p>
@@ -2367,7 +2367,7 @@
             <a:fld id="{AFF29E89-4237-4E4B-9600-F71E36C17C35}" type="datetimeFigureOut">
               <a:rPr lang="en-US" smtClean="0"/>
               <a:pPr/>
-              <a:t>9/13/2023</a:t>
+              <a:t>9/16/2023</a:t>
             </a:fld>
             <a:endParaRPr lang="en-US"/>
           </a:p>
@@ -2615,7 +2615,7 @@
             <a:fld id="{AFF29E89-4237-4E4B-9600-F71E36C17C35}" type="datetimeFigureOut">
               <a:rPr lang="en-US" smtClean="0"/>
               <a:pPr/>
-              <a:t>9/13/2023</a:t>
+              <a:t>9/16/2023</a:t>
             </a:fld>
             <a:endParaRPr lang="en-US"/>
           </a:p>
@@ -2849,7 +2849,7 @@
             <a:fld id="{AFF29E89-4237-4E4B-9600-F71E36C17C35}" type="datetimeFigureOut">
               <a:rPr lang="en-US" smtClean="0"/>
               <a:pPr/>
-              <a:t>9/13/2023</a:t>
+              <a:t>9/16/2023</a:t>
             </a:fld>
             <a:endParaRPr lang="en-US"/>
           </a:p>
@@ -3218,7 +3218,7 @@
             <a:fld id="{AFF29E89-4237-4E4B-9600-F71E36C17C35}" type="datetimeFigureOut">
               <a:rPr lang="en-US" smtClean="0"/>
               <a:pPr/>
-              <a:t>9/13/2023</a:t>
+              <a:t>9/16/2023</a:t>
             </a:fld>
             <a:endParaRPr lang="en-US"/>
           </a:p>
@@ -3338,7 +3338,7 @@
             <a:fld id="{AFF29E89-4237-4E4B-9600-F71E36C17C35}" type="datetimeFigureOut">
               <a:rPr lang="en-US" smtClean="0"/>
               <a:pPr/>
-              <a:t>9/13/2023</a:t>
+              <a:t>9/16/2023</a:t>
             </a:fld>
             <a:endParaRPr lang="en-US"/>
           </a:p>
@@ -3435,7 +3435,7 @@
             <a:fld id="{AFF29E89-4237-4E4B-9600-F71E36C17C35}" type="datetimeFigureOut">
               <a:rPr lang="en-US" smtClean="0"/>
               <a:pPr/>
-              <a:t>9/13/2023</a:t>
+              <a:t>9/16/2023</a:t>
             </a:fld>
             <a:endParaRPr lang="en-US"/>
           </a:p>
@@ -3714,7 +3714,7 @@
             <a:fld id="{AFF29E89-4237-4E4B-9600-F71E36C17C35}" type="datetimeFigureOut">
               <a:rPr lang="en-US" smtClean="0"/>
               <a:pPr/>
-              <a:t>9/13/2023</a:t>
+              <a:t>9/16/2023</a:t>
             </a:fld>
             <a:endParaRPr lang="en-US"/>
           </a:p>
@@ -3969,7 +3969,7 @@
             <a:fld id="{AFF29E89-4237-4E4B-9600-F71E36C17C35}" type="datetimeFigureOut">
               <a:rPr lang="en-US" smtClean="0"/>
               <a:pPr/>
-              <a:t>9/13/2023</a:t>
+              <a:t>9/16/2023</a:t>
             </a:fld>
             <a:endParaRPr lang="en-US"/>
           </a:p>
@@ -4184,7 +4184,7 @@
             <a:fld id="{AFF29E89-4237-4E4B-9600-F71E36C17C35}" type="datetimeFigureOut">
               <a:rPr lang="en-US" smtClean="0"/>
               <a:pPr/>
-              <a:t>9/13/2023</a:t>
+              <a:t>9/16/2023</a:t>
             </a:fld>
             <a:endParaRPr lang="en-US"/>
           </a:p>
@@ -5333,11 +5333,19 @@
           <a:p>
             <a:r>
               <a:rPr lang="lt-LT" sz="2000" dirty="0"/>
-              <a:t>Intensyvūs žaidimai gali sukelti didelę emocinę įtampą ir stresą, ypač jei žaidėjas susiduria su iššūkiais ar konkurencija. Didelis emocinis įtampas gali turėti neigiamų pasekmių </a:t>
+              <a:t>Intensyvūs žaidimai gali sukelti didelę emocinę įtampą ir stresą, ypač jei žaidėjas susiduria su iššūkiais ar konkurencija. </a:t>
             </a:r>
             <a:r>
               <a:rPr lang="lt-LT" sz="2000" dirty="0" smtClean="0"/>
-              <a:t>fiziniai </a:t>
+              <a:t>Didelė emocinė įtampa </a:t>
+            </a:r>
+            <a:r>
+              <a:rPr lang="lt-LT" sz="2000" dirty="0"/>
+              <a:t>gali turėti neigiamų pasekmių </a:t>
+            </a:r>
+            <a:r>
+              <a:rPr lang="lt-LT" sz="2000" dirty="0" smtClean="0"/>
+              <a:t>fizinei </a:t>
             </a:r>
             <a:r>
               <a:rPr lang="lt-LT" sz="2000" dirty="0"/>

</xml_diff>